<commit_message>
comb the call relationship of DSMCC
</commit_message>
<xml_diff>
--- a/doc/EverStation软件架构-2018082500.pptx
+++ b/doc/EverStation软件架构-2018082500.pptx
@@ -8,6 +8,7 @@
     <p:sldId id="256" r:id="rId2"/>
     <p:sldId id="257" r:id="rId3"/>
     <p:sldId id="258" r:id="rId4"/>
+    <p:sldId id="260" r:id="rId5"/>
   </p:sldIdLst>
   <p:sldSz cx="12192000" cy="6858000"/>
   <p:notesSz cx="6858000" cy="9144000"/>
@@ -272,7 +273,7 @@
           <a:p>
             <a:fld id="{25500F52-4A40-4366-8FBB-3E4F48A159C8}" type="datetimeFigureOut">
               <a:rPr lang="zh-CN" altLang="en-US" smtClean="0"/>
-              <a:t>2018/10/3</a:t>
+              <a:t>2018/10/5</a:t>
             </a:fld>
             <a:endParaRPr lang="zh-CN" altLang="en-US"/>
           </a:p>
@@ -470,7 +471,7 @@
           <a:p>
             <a:fld id="{25500F52-4A40-4366-8FBB-3E4F48A159C8}" type="datetimeFigureOut">
               <a:rPr lang="zh-CN" altLang="en-US" smtClean="0"/>
-              <a:t>2018/10/3</a:t>
+              <a:t>2018/10/5</a:t>
             </a:fld>
             <a:endParaRPr lang="zh-CN" altLang="en-US"/>
           </a:p>
@@ -678,7 +679,7 @@
           <a:p>
             <a:fld id="{25500F52-4A40-4366-8FBB-3E4F48A159C8}" type="datetimeFigureOut">
               <a:rPr lang="zh-CN" altLang="en-US" smtClean="0"/>
-              <a:t>2018/10/3</a:t>
+              <a:t>2018/10/5</a:t>
             </a:fld>
             <a:endParaRPr lang="zh-CN" altLang="en-US"/>
           </a:p>
@@ -876,7 +877,7 @@
           <a:p>
             <a:fld id="{25500F52-4A40-4366-8FBB-3E4F48A159C8}" type="datetimeFigureOut">
               <a:rPr lang="zh-CN" altLang="en-US" smtClean="0"/>
-              <a:t>2018/10/3</a:t>
+              <a:t>2018/10/5</a:t>
             </a:fld>
             <a:endParaRPr lang="zh-CN" altLang="en-US"/>
           </a:p>
@@ -1151,7 +1152,7 @@
           <a:p>
             <a:fld id="{25500F52-4A40-4366-8FBB-3E4F48A159C8}" type="datetimeFigureOut">
               <a:rPr lang="zh-CN" altLang="en-US" smtClean="0"/>
-              <a:t>2018/10/3</a:t>
+              <a:t>2018/10/5</a:t>
             </a:fld>
             <a:endParaRPr lang="zh-CN" altLang="en-US"/>
           </a:p>
@@ -1416,7 +1417,7 @@
           <a:p>
             <a:fld id="{25500F52-4A40-4366-8FBB-3E4F48A159C8}" type="datetimeFigureOut">
               <a:rPr lang="zh-CN" altLang="en-US" smtClean="0"/>
-              <a:t>2018/10/3</a:t>
+              <a:t>2018/10/5</a:t>
             </a:fld>
             <a:endParaRPr lang="zh-CN" altLang="en-US"/>
           </a:p>
@@ -1828,7 +1829,7 @@
           <a:p>
             <a:fld id="{25500F52-4A40-4366-8FBB-3E4F48A159C8}" type="datetimeFigureOut">
               <a:rPr lang="zh-CN" altLang="en-US" smtClean="0"/>
-              <a:t>2018/10/3</a:t>
+              <a:t>2018/10/5</a:t>
             </a:fld>
             <a:endParaRPr lang="zh-CN" altLang="en-US"/>
           </a:p>
@@ -1969,7 +1970,7 @@
           <a:p>
             <a:fld id="{25500F52-4A40-4366-8FBB-3E4F48A159C8}" type="datetimeFigureOut">
               <a:rPr lang="zh-CN" altLang="en-US" smtClean="0"/>
-              <a:t>2018/10/3</a:t>
+              <a:t>2018/10/5</a:t>
             </a:fld>
             <a:endParaRPr lang="zh-CN" altLang="en-US"/>
           </a:p>
@@ -2082,7 +2083,7 @@
           <a:p>
             <a:fld id="{25500F52-4A40-4366-8FBB-3E4F48A159C8}" type="datetimeFigureOut">
               <a:rPr lang="zh-CN" altLang="en-US" smtClean="0"/>
-              <a:t>2018/10/3</a:t>
+              <a:t>2018/10/5</a:t>
             </a:fld>
             <a:endParaRPr lang="zh-CN" altLang="en-US"/>
           </a:p>
@@ -2393,7 +2394,7 @@
           <a:p>
             <a:fld id="{25500F52-4A40-4366-8FBB-3E4F48A159C8}" type="datetimeFigureOut">
               <a:rPr lang="zh-CN" altLang="en-US" smtClean="0"/>
-              <a:t>2018/10/3</a:t>
+              <a:t>2018/10/5</a:t>
             </a:fld>
             <a:endParaRPr lang="zh-CN" altLang="en-US"/>
           </a:p>
@@ -2681,7 +2682,7 @@
           <a:p>
             <a:fld id="{25500F52-4A40-4366-8FBB-3E4F48A159C8}" type="datetimeFigureOut">
               <a:rPr lang="zh-CN" altLang="en-US" smtClean="0"/>
-              <a:t>2018/10/3</a:t>
+              <a:t>2018/10/5</a:t>
             </a:fld>
             <a:endParaRPr lang="zh-CN" altLang="en-US"/>
           </a:p>
@@ -2922,7 +2923,7 @@
           <a:p>
             <a:fld id="{25500F52-4A40-4366-8FBB-3E4F48A159C8}" type="datetimeFigureOut">
               <a:rPr lang="zh-CN" altLang="en-US" smtClean="0"/>
-              <a:t>2018/10/3</a:t>
+              <a:t>2018/10/5</a:t>
             </a:fld>
             <a:endParaRPr lang="zh-CN" altLang="en-US"/>
           </a:p>
@@ -6613,7 +6614,12 @@
             <p:ph type="title"/>
           </p:nvPr>
         </p:nvSpPr>
-        <p:spPr/>
+        <p:spPr>
+          <a:xfrm>
+            <a:off x="838200" y="365125"/>
+            <a:ext cx="10515600" cy="1325563"/>
+          </a:xfrm>
+        </p:spPr>
         <p:txBody>
           <a:bodyPr/>
           <a:lstStyle/>
@@ -6633,6 +6639,794 @@
     <p:extLst>
       <p:ext uri="{BB962C8B-B14F-4D97-AF65-F5344CB8AC3E}">
         <p14:creationId xmlns:p14="http://schemas.microsoft.com/office/powerpoint/2010/main" val="39490342"/>
+      </p:ext>
+    </p:extLst>
+  </p:cSld>
+  <p:clrMapOvr>
+    <a:masterClrMapping/>
+  </p:clrMapOvr>
+</p:sld>
+</file>
+
+<file path=ppt/slides/slide4.xml><?xml version="1.0" encoding="utf-8"?>
+<p:sld xmlns:a="http://schemas.openxmlformats.org/drawingml/2006/main" xmlns:r="http://schemas.openxmlformats.org/officeDocument/2006/relationships" xmlns:p="http://schemas.openxmlformats.org/presentationml/2006/main">
+  <p:cSld>
+    <p:spTree>
+      <p:nvGrpSpPr>
+        <p:cNvPr id="1" name=""/>
+        <p:cNvGrpSpPr/>
+        <p:nvPr/>
+      </p:nvGrpSpPr>
+      <p:grpSpPr>
+        <a:xfrm>
+          <a:off x="0" y="0"/>
+          <a:ext cx="0" cy="0"/>
+          <a:chOff x="0" y="0"/>
+          <a:chExt cx="0" cy="0"/>
+        </a:xfrm>
+      </p:grpSpPr>
+      <p:sp>
+        <p:nvSpPr>
+          <p:cNvPr id="2" name="矩形 1">
+            <a:extLst>
+              <a:ext uri="{FF2B5EF4-FFF2-40B4-BE49-F238E27FC236}">
+                <a16:creationId xmlns:a16="http://schemas.microsoft.com/office/drawing/2014/main" id="{E7BDDA9F-12C0-400C-BF72-1DEE9A56ABAC}"/>
+              </a:ext>
+            </a:extLst>
+          </p:cNvPr>
+          <p:cNvSpPr/>
+          <p:nvPr/>
+        </p:nvSpPr>
+        <p:spPr>
+          <a:xfrm>
+            <a:off x="5290563" y="2454592"/>
+            <a:ext cx="2676570" cy="450572"/>
+          </a:xfrm>
+          <a:prstGeom prst="rect">
+            <a:avLst/>
+          </a:prstGeom>
+          <a:solidFill>
+            <a:srgbClr val="00B050"/>
+          </a:solidFill>
+        </p:spPr>
+        <p:style>
+          <a:lnRef idx="2">
+            <a:schemeClr val="accent1">
+              <a:shade val="50000"/>
+            </a:schemeClr>
+          </a:lnRef>
+          <a:fillRef idx="1">
+            <a:schemeClr val="accent1"/>
+          </a:fillRef>
+          <a:effectRef idx="0">
+            <a:schemeClr val="accent1"/>
+          </a:effectRef>
+          <a:fontRef idx="minor">
+            <a:schemeClr val="lt1"/>
+          </a:fontRef>
+        </p:style>
+        <p:txBody>
+          <a:bodyPr rtlCol="0" anchor="ctr"/>
+          <a:lstStyle/>
+          <a:p>
+            <a:pPr algn="ctr"/>
+            <a:r>
+              <a:rPr lang="en-US" altLang="zh-CN" sz="1200" dirty="0" err="1"/>
+              <a:t>DSMCC_Section_XML</a:t>
+            </a:r>
+            <a:endParaRPr lang="zh-CN" altLang="en-US" sz="1200" dirty="0"/>
+          </a:p>
+        </p:txBody>
+      </p:sp>
+      <p:sp>
+        <p:nvSpPr>
+          <p:cNvPr id="3" name="矩形 2">
+            <a:extLst>
+              <a:ext uri="{FF2B5EF4-FFF2-40B4-BE49-F238E27FC236}">
+                <a16:creationId xmlns:a16="http://schemas.microsoft.com/office/drawing/2014/main" id="{90A124A7-3679-4554-A68B-EA8D5BC6510F}"/>
+              </a:ext>
+            </a:extLst>
+          </p:cNvPr>
+          <p:cNvSpPr/>
+          <p:nvPr/>
+        </p:nvSpPr>
+        <p:spPr>
+          <a:xfrm>
+            <a:off x="2484786" y="3395132"/>
+            <a:ext cx="4025343" cy="450572"/>
+          </a:xfrm>
+          <a:prstGeom prst="rect">
+            <a:avLst/>
+          </a:prstGeom>
+          <a:solidFill>
+            <a:srgbClr val="00B050"/>
+          </a:solidFill>
+        </p:spPr>
+        <p:style>
+          <a:lnRef idx="2">
+            <a:schemeClr val="accent1">
+              <a:shade val="50000"/>
+            </a:schemeClr>
+          </a:lnRef>
+          <a:fillRef idx="1">
+            <a:schemeClr val="accent1"/>
+          </a:fillRef>
+          <a:effectRef idx="0">
+            <a:schemeClr val="accent1"/>
+          </a:effectRef>
+          <a:fontRef idx="minor">
+            <a:schemeClr val="lt1"/>
+          </a:fontRef>
+        </p:style>
+        <p:txBody>
+          <a:bodyPr rtlCol="0" anchor="ctr"/>
+          <a:lstStyle/>
+          <a:p>
+            <a:pPr algn="ctr"/>
+            <a:r>
+              <a:rPr lang="en-US" altLang="zh-CN" sz="1200" dirty="0" err="1"/>
+              <a:t>DSMCC_Section_in_Native</a:t>
+            </a:r>
+            <a:endParaRPr lang="zh-CN" altLang="en-US" sz="1200" dirty="0"/>
+          </a:p>
+        </p:txBody>
+      </p:sp>
+      <p:sp>
+        <p:nvSpPr>
+          <p:cNvPr id="4" name="矩形 3">
+            <a:extLst>
+              <a:ext uri="{FF2B5EF4-FFF2-40B4-BE49-F238E27FC236}">
+                <a16:creationId xmlns:a16="http://schemas.microsoft.com/office/drawing/2014/main" id="{C7B266EA-E485-4AFA-8E45-36D6BE2EFDAC}"/>
+              </a:ext>
+            </a:extLst>
+          </p:cNvPr>
+          <p:cNvSpPr/>
+          <p:nvPr/>
+        </p:nvSpPr>
+        <p:spPr>
+          <a:xfrm>
+            <a:off x="6838490" y="3395132"/>
+            <a:ext cx="3329977" cy="450572"/>
+          </a:xfrm>
+          <a:prstGeom prst="rect">
+            <a:avLst/>
+          </a:prstGeom>
+          <a:solidFill>
+            <a:srgbClr val="00B050"/>
+          </a:solidFill>
+        </p:spPr>
+        <p:style>
+          <a:lnRef idx="2">
+            <a:schemeClr val="accent1">
+              <a:shade val="50000"/>
+            </a:schemeClr>
+          </a:lnRef>
+          <a:fillRef idx="1">
+            <a:schemeClr val="accent1"/>
+          </a:fillRef>
+          <a:effectRef idx="0">
+            <a:schemeClr val="accent1"/>
+          </a:effectRef>
+          <a:fontRef idx="minor">
+            <a:schemeClr val="lt1"/>
+          </a:fontRef>
+        </p:style>
+        <p:txBody>
+          <a:bodyPr rtlCol="0" anchor="ctr"/>
+          <a:lstStyle/>
+          <a:p>
+            <a:pPr algn="ctr"/>
+            <a:r>
+              <a:rPr lang="en-US" altLang="zh-CN" sz="1200" dirty="0" err="1"/>
+              <a:t>DSMCC_Section_Present_to_XML</a:t>
+            </a:r>
+            <a:endParaRPr lang="zh-CN" altLang="en-US" sz="1200" dirty="0"/>
+          </a:p>
+        </p:txBody>
+      </p:sp>
+      <p:cxnSp>
+        <p:nvCxnSpPr>
+          <p:cNvPr id="5" name="直接连接符 4">
+            <a:extLst>
+              <a:ext uri="{FF2B5EF4-FFF2-40B4-BE49-F238E27FC236}">
+                <a16:creationId xmlns:a16="http://schemas.microsoft.com/office/drawing/2014/main" id="{FDEE7486-4D9C-4B29-A21D-5E41A5DFF8B9}"/>
+              </a:ext>
+            </a:extLst>
+          </p:cNvPr>
+          <p:cNvCxnSpPr>
+            <a:cxnSpLocks/>
+          </p:cNvCxnSpPr>
+          <p:nvPr/>
+        </p:nvCxnSpPr>
+        <p:spPr>
+          <a:xfrm>
+            <a:off x="2484786" y="1970904"/>
+            <a:ext cx="7941362" cy="0"/>
+          </a:xfrm>
+          <a:prstGeom prst="line">
+            <a:avLst/>
+          </a:prstGeom>
+          <a:ln w="28575">
+            <a:solidFill>
+              <a:schemeClr val="tx1"/>
+            </a:solidFill>
+          </a:ln>
+        </p:spPr>
+        <p:style>
+          <a:lnRef idx="1">
+            <a:schemeClr val="accent1"/>
+          </a:lnRef>
+          <a:fillRef idx="0">
+            <a:schemeClr val="accent1"/>
+          </a:fillRef>
+          <a:effectRef idx="0">
+            <a:schemeClr val="accent1"/>
+          </a:effectRef>
+          <a:fontRef idx="minor">
+            <a:schemeClr val="tx1"/>
+          </a:fontRef>
+        </p:style>
+      </p:cxnSp>
+      <p:cxnSp>
+        <p:nvCxnSpPr>
+          <p:cNvPr id="6" name="直接连接符 5">
+            <a:extLst>
+              <a:ext uri="{FF2B5EF4-FFF2-40B4-BE49-F238E27FC236}">
+                <a16:creationId xmlns:a16="http://schemas.microsoft.com/office/drawing/2014/main" id="{804C7139-8FCF-48F3-8E9C-D68BC89C64B8}"/>
+              </a:ext>
+            </a:extLst>
+          </p:cNvPr>
+          <p:cNvCxnSpPr>
+            <a:cxnSpLocks/>
+          </p:cNvCxnSpPr>
+          <p:nvPr/>
+        </p:nvCxnSpPr>
+        <p:spPr>
+          <a:xfrm flipV="1">
+            <a:off x="6628848" y="1970905"/>
+            <a:ext cx="0" cy="494367"/>
+          </a:xfrm>
+          <a:prstGeom prst="line">
+            <a:avLst/>
+          </a:prstGeom>
+          <a:ln w="25400">
+            <a:solidFill>
+              <a:schemeClr val="tx1"/>
+            </a:solidFill>
+            <a:headEnd type="none"/>
+            <a:tailEnd type="stealth"/>
+          </a:ln>
+        </p:spPr>
+        <p:style>
+          <a:lnRef idx="1">
+            <a:schemeClr val="accent1"/>
+          </a:lnRef>
+          <a:fillRef idx="0">
+            <a:schemeClr val="accent1"/>
+          </a:fillRef>
+          <a:effectRef idx="0">
+            <a:schemeClr val="accent1"/>
+          </a:effectRef>
+          <a:fontRef idx="minor">
+            <a:schemeClr val="tx1"/>
+          </a:fontRef>
+        </p:style>
+      </p:cxnSp>
+      <p:cxnSp>
+        <p:nvCxnSpPr>
+          <p:cNvPr id="11" name="直接连接符 10">
+            <a:extLst>
+              <a:ext uri="{FF2B5EF4-FFF2-40B4-BE49-F238E27FC236}">
+                <a16:creationId xmlns:a16="http://schemas.microsoft.com/office/drawing/2014/main" id="{8FED52CA-B596-4091-AF16-F32D3A3F4BCE}"/>
+              </a:ext>
+            </a:extLst>
+          </p:cNvPr>
+          <p:cNvCxnSpPr>
+            <a:cxnSpLocks/>
+          </p:cNvCxnSpPr>
+          <p:nvPr/>
+        </p:nvCxnSpPr>
+        <p:spPr>
+          <a:xfrm flipV="1">
+            <a:off x="8977796" y="1970905"/>
+            <a:ext cx="0" cy="1424227"/>
+          </a:xfrm>
+          <a:prstGeom prst="line">
+            <a:avLst/>
+          </a:prstGeom>
+          <a:ln w="25400">
+            <a:solidFill>
+              <a:schemeClr val="tx1"/>
+            </a:solidFill>
+            <a:headEnd type="none"/>
+            <a:tailEnd type="stealth"/>
+          </a:ln>
+        </p:spPr>
+        <p:style>
+          <a:lnRef idx="1">
+            <a:schemeClr val="accent1"/>
+          </a:lnRef>
+          <a:fillRef idx="0">
+            <a:schemeClr val="accent1"/>
+          </a:fillRef>
+          <a:effectRef idx="0">
+            <a:schemeClr val="accent1"/>
+          </a:effectRef>
+          <a:fontRef idx="minor">
+            <a:schemeClr val="tx1"/>
+          </a:fontRef>
+        </p:style>
+      </p:cxnSp>
+      <p:cxnSp>
+        <p:nvCxnSpPr>
+          <p:cNvPr id="13" name="直接连接符 12">
+            <a:extLst>
+              <a:ext uri="{FF2B5EF4-FFF2-40B4-BE49-F238E27FC236}">
+                <a16:creationId xmlns:a16="http://schemas.microsoft.com/office/drawing/2014/main" id="{B365A59D-D5EA-40F5-98D4-B4C50C3200D5}"/>
+              </a:ext>
+            </a:extLst>
+          </p:cNvPr>
+          <p:cNvCxnSpPr>
+            <a:cxnSpLocks/>
+          </p:cNvCxnSpPr>
+          <p:nvPr/>
+        </p:nvCxnSpPr>
+        <p:spPr>
+          <a:xfrm flipV="1">
+            <a:off x="4654275" y="1970905"/>
+            <a:ext cx="0" cy="1424227"/>
+          </a:xfrm>
+          <a:prstGeom prst="line">
+            <a:avLst/>
+          </a:prstGeom>
+          <a:ln w="25400">
+            <a:solidFill>
+              <a:schemeClr val="tx1"/>
+            </a:solidFill>
+            <a:headEnd type="none"/>
+            <a:tailEnd type="stealth"/>
+          </a:ln>
+        </p:spPr>
+        <p:style>
+          <a:lnRef idx="1">
+            <a:schemeClr val="accent1"/>
+          </a:lnRef>
+          <a:fillRef idx="0">
+            <a:schemeClr val="accent1"/>
+          </a:fillRef>
+          <a:effectRef idx="0">
+            <a:schemeClr val="accent1"/>
+          </a:effectRef>
+          <a:fontRef idx="minor">
+            <a:schemeClr val="tx1"/>
+          </a:fontRef>
+        </p:style>
+      </p:cxnSp>
+      <p:cxnSp>
+        <p:nvCxnSpPr>
+          <p:cNvPr id="16" name="直接连接符 15">
+            <a:extLst>
+              <a:ext uri="{FF2B5EF4-FFF2-40B4-BE49-F238E27FC236}">
+                <a16:creationId xmlns:a16="http://schemas.microsoft.com/office/drawing/2014/main" id="{B928CB8A-F1D2-45E2-85B5-8A890FFA4F4D}"/>
+              </a:ext>
+            </a:extLst>
+          </p:cNvPr>
+          <p:cNvCxnSpPr>
+            <a:cxnSpLocks/>
+          </p:cNvCxnSpPr>
+          <p:nvPr/>
+        </p:nvCxnSpPr>
+        <p:spPr>
+          <a:xfrm flipV="1">
+            <a:off x="6096000" y="2900765"/>
+            <a:ext cx="0" cy="494367"/>
+          </a:xfrm>
+          <a:prstGeom prst="line">
+            <a:avLst/>
+          </a:prstGeom>
+          <a:ln w="25400">
+            <a:solidFill>
+              <a:schemeClr val="tx1"/>
+            </a:solidFill>
+            <a:headEnd type="none"/>
+            <a:tailEnd type="stealth"/>
+          </a:ln>
+        </p:spPr>
+        <p:style>
+          <a:lnRef idx="1">
+            <a:schemeClr val="accent1"/>
+          </a:lnRef>
+          <a:fillRef idx="0">
+            <a:schemeClr val="accent1"/>
+          </a:fillRef>
+          <a:effectRef idx="0">
+            <a:schemeClr val="accent1"/>
+          </a:effectRef>
+          <a:fontRef idx="minor">
+            <a:schemeClr val="tx1"/>
+          </a:fontRef>
+        </p:style>
+      </p:cxnSp>
+      <p:cxnSp>
+        <p:nvCxnSpPr>
+          <p:cNvPr id="17" name="直接连接符 16">
+            <a:extLst>
+              <a:ext uri="{FF2B5EF4-FFF2-40B4-BE49-F238E27FC236}">
+                <a16:creationId xmlns:a16="http://schemas.microsoft.com/office/drawing/2014/main" id="{F004A6B9-E1D7-413D-AB66-E10F7235EFE1}"/>
+              </a:ext>
+            </a:extLst>
+          </p:cNvPr>
+          <p:cNvCxnSpPr>
+            <a:cxnSpLocks/>
+          </p:cNvCxnSpPr>
+          <p:nvPr/>
+        </p:nvCxnSpPr>
+        <p:spPr>
+          <a:xfrm flipV="1">
+            <a:off x="7520609" y="2900765"/>
+            <a:ext cx="0" cy="494367"/>
+          </a:xfrm>
+          <a:prstGeom prst="line">
+            <a:avLst/>
+          </a:prstGeom>
+          <a:ln w="25400">
+            <a:solidFill>
+              <a:schemeClr val="tx1"/>
+            </a:solidFill>
+            <a:headEnd type="none"/>
+            <a:tailEnd type="stealth"/>
+          </a:ln>
+        </p:spPr>
+        <p:style>
+          <a:lnRef idx="1">
+            <a:schemeClr val="accent1"/>
+          </a:lnRef>
+          <a:fillRef idx="0">
+            <a:schemeClr val="accent1"/>
+          </a:fillRef>
+          <a:effectRef idx="0">
+            <a:schemeClr val="accent1"/>
+          </a:effectRef>
+          <a:fontRef idx="minor">
+            <a:schemeClr val="tx1"/>
+          </a:fontRef>
+        </p:style>
+      </p:cxnSp>
+      <p:cxnSp>
+        <p:nvCxnSpPr>
+          <p:cNvPr id="28" name="直接连接符 27">
+            <a:extLst>
+              <a:ext uri="{FF2B5EF4-FFF2-40B4-BE49-F238E27FC236}">
+                <a16:creationId xmlns:a16="http://schemas.microsoft.com/office/drawing/2014/main" id="{924BF3B1-8E9B-4CD1-9367-114DD819BCAC}"/>
+              </a:ext>
+            </a:extLst>
+          </p:cNvPr>
+          <p:cNvCxnSpPr>
+            <a:cxnSpLocks/>
+          </p:cNvCxnSpPr>
+          <p:nvPr/>
+        </p:nvCxnSpPr>
+        <p:spPr>
+          <a:xfrm flipV="1">
+            <a:off x="5083499" y="3855643"/>
+            <a:ext cx="0" cy="494367"/>
+          </a:xfrm>
+          <a:prstGeom prst="line">
+            <a:avLst/>
+          </a:prstGeom>
+          <a:ln w="25400">
+            <a:solidFill>
+              <a:schemeClr val="tx1"/>
+            </a:solidFill>
+            <a:headEnd type="none"/>
+            <a:tailEnd type="stealth"/>
+          </a:ln>
+        </p:spPr>
+        <p:style>
+          <a:lnRef idx="1">
+            <a:schemeClr val="accent1"/>
+          </a:lnRef>
+          <a:fillRef idx="0">
+            <a:schemeClr val="accent1"/>
+          </a:fillRef>
+          <a:effectRef idx="0">
+            <a:schemeClr val="accent1"/>
+          </a:effectRef>
+          <a:fontRef idx="minor">
+            <a:schemeClr val="tx1"/>
+          </a:fontRef>
+        </p:style>
+      </p:cxnSp>
+      <p:cxnSp>
+        <p:nvCxnSpPr>
+          <p:cNvPr id="29" name="直接连接符 28">
+            <a:extLst>
+              <a:ext uri="{FF2B5EF4-FFF2-40B4-BE49-F238E27FC236}">
+                <a16:creationId xmlns:a16="http://schemas.microsoft.com/office/drawing/2014/main" id="{A76B5B45-4FCA-406E-AA05-8FC52FB3CD11}"/>
+              </a:ext>
+            </a:extLst>
+          </p:cNvPr>
+          <p:cNvCxnSpPr>
+            <a:cxnSpLocks/>
+          </p:cNvCxnSpPr>
+          <p:nvPr/>
+        </p:nvCxnSpPr>
+        <p:spPr>
+          <a:xfrm flipV="1">
+            <a:off x="3611584" y="3864481"/>
+            <a:ext cx="0" cy="494367"/>
+          </a:xfrm>
+          <a:prstGeom prst="line">
+            <a:avLst/>
+          </a:prstGeom>
+          <a:ln w="25400">
+            <a:solidFill>
+              <a:schemeClr val="tx1"/>
+            </a:solidFill>
+            <a:headEnd type="none"/>
+            <a:tailEnd type="stealth"/>
+          </a:ln>
+        </p:spPr>
+        <p:style>
+          <a:lnRef idx="1">
+            <a:schemeClr val="accent1"/>
+          </a:lnRef>
+          <a:fillRef idx="0">
+            <a:schemeClr val="accent1"/>
+          </a:fillRef>
+          <a:effectRef idx="0">
+            <a:schemeClr val="accent1"/>
+          </a:effectRef>
+          <a:fontRef idx="minor">
+            <a:schemeClr val="tx1"/>
+          </a:fontRef>
+        </p:style>
+      </p:cxnSp>
+      <p:sp>
+        <p:nvSpPr>
+          <p:cNvPr id="30" name="标题 29">
+            <a:extLst>
+              <a:ext uri="{FF2B5EF4-FFF2-40B4-BE49-F238E27FC236}">
+                <a16:creationId xmlns:a16="http://schemas.microsoft.com/office/drawing/2014/main" id="{415DC61F-8E10-48A4-AB16-A0ADFA6B585A}"/>
+              </a:ext>
+            </a:extLst>
+          </p:cNvPr>
+          <p:cNvSpPr>
+            <a:spLocks noGrp="1"/>
+          </p:cNvSpPr>
+          <p:nvPr>
+            <p:ph type="title"/>
+          </p:nvPr>
+        </p:nvSpPr>
+        <p:spPr>
+          <a:xfrm>
+            <a:off x="838200" y="365125"/>
+            <a:ext cx="10515600" cy="1325563"/>
+          </a:xfrm>
+        </p:spPr>
+        <p:txBody>
+          <a:bodyPr/>
+          <a:lstStyle/>
+          <a:p>
+            <a:r>
+              <a:rPr lang="en-US" altLang="zh-CN" b="1" dirty="0"/>
+              <a:t>DSMCC</a:t>
+            </a:r>
+            <a:r>
+              <a:rPr lang="zh-CN" altLang="en-US" b="1" dirty="0"/>
+              <a:t>的调用关系</a:t>
+            </a:r>
+          </a:p>
+        </p:txBody>
+      </p:sp>
+      <p:sp>
+        <p:nvSpPr>
+          <p:cNvPr id="24" name="矩形 23">
+            <a:extLst>
+              <a:ext uri="{FF2B5EF4-FFF2-40B4-BE49-F238E27FC236}">
+                <a16:creationId xmlns:a16="http://schemas.microsoft.com/office/drawing/2014/main" id="{B795794F-4D15-4C24-996C-046C55941EDE}"/>
+              </a:ext>
+            </a:extLst>
+          </p:cNvPr>
+          <p:cNvSpPr/>
+          <p:nvPr/>
+        </p:nvSpPr>
+        <p:spPr>
+          <a:xfrm>
+            <a:off x="2916584" y="4384633"/>
+            <a:ext cx="1426809" cy="450572"/>
+          </a:xfrm>
+          <a:prstGeom prst="rect">
+            <a:avLst/>
+          </a:prstGeom>
+          <a:solidFill>
+            <a:srgbClr val="00B050"/>
+          </a:solidFill>
+        </p:spPr>
+        <p:style>
+          <a:lnRef idx="2">
+            <a:schemeClr val="accent1">
+              <a:shade val="50000"/>
+            </a:schemeClr>
+          </a:lnRef>
+          <a:fillRef idx="1">
+            <a:schemeClr val="accent1"/>
+          </a:fillRef>
+          <a:effectRef idx="0">
+            <a:schemeClr val="accent1"/>
+          </a:effectRef>
+          <a:fontRef idx="minor">
+            <a:schemeClr val="lt1"/>
+          </a:fontRef>
+        </p:style>
+        <p:txBody>
+          <a:bodyPr rtlCol="0" anchor="ctr"/>
+          <a:lstStyle/>
+          <a:p>
+            <a:pPr algn="ctr"/>
+            <a:r>
+              <a:rPr lang="en-US" altLang="zh-CN" sz="1200" dirty="0"/>
+              <a:t>UNM</a:t>
+            </a:r>
+            <a:endParaRPr lang="zh-CN" altLang="en-US" sz="1200" dirty="0"/>
+          </a:p>
+        </p:txBody>
+      </p:sp>
+      <p:cxnSp>
+        <p:nvCxnSpPr>
+          <p:cNvPr id="25" name="直接连接符 24">
+            <a:extLst>
+              <a:ext uri="{FF2B5EF4-FFF2-40B4-BE49-F238E27FC236}">
+                <a16:creationId xmlns:a16="http://schemas.microsoft.com/office/drawing/2014/main" id="{B4EBA0C4-9DEC-441F-889D-C3D2F2F8ACE3}"/>
+              </a:ext>
+            </a:extLst>
+          </p:cNvPr>
+          <p:cNvCxnSpPr>
+            <a:cxnSpLocks/>
+          </p:cNvCxnSpPr>
+          <p:nvPr/>
+        </p:nvCxnSpPr>
+        <p:spPr>
+          <a:xfrm flipV="1">
+            <a:off x="3611584" y="4853982"/>
+            <a:ext cx="0" cy="494367"/>
+          </a:xfrm>
+          <a:prstGeom prst="line">
+            <a:avLst/>
+          </a:prstGeom>
+          <a:ln w="25400">
+            <a:solidFill>
+              <a:schemeClr val="tx1"/>
+            </a:solidFill>
+            <a:headEnd type="none"/>
+            <a:tailEnd type="stealth"/>
+          </a:ln>
+        </p:spPr>
+        <p:style>
+          <a:lnRef idx="1">
+            <a:schemeClr val="accent1"/>
+          </a:lnRef>
+          <a:fillRef idx="0">
+            <a:schemeClr val="accent1"/>
+          </a:fillRef>
+          <a:effectRef idx="0">
+            <a:schemeClr val="accent1"/>
+          </a:effectRef>
+          <a:fontRef idx="minor">
+            <a:schemeClr val="tx1"/>
+          </a:fontRef>
+        </p:style>
+      </p:cxnSp>
+      <p:sp>
+        <p:nvSpPr>
+          <p:cNvPr id="31" name="矩形 30">
+            <a:extLst>
+              <a:ext uri="{FF2B5EF4-FFF2-40B4-BE49-F238E27FC236}">
+                <a16:creationId xmlns:a16="http://schemas.microsoft.com/office/drawing/2014/main" id="{C90648F5-0F04-41C2-B745-2227FAECED4F}"/>
+              </a:ext>
+            </a:extLst>
+          </p:cNvPr>
+          <p:cNvSpPr/>
+          <p:nvPr/>
+        </p:nvSpPr>
+        <p:spPr>
+          <a:xfrm>
+            <a:off x="2916584" y="5374134"/>
+            <a:ext cx="1426809" cy="450572"/>
+          </a:xfrm>
+          <a:prstGeom prst="rect">
+            <a:avLst/>
+          </a:prstGeom>
+          <a:solidFill>
+            <a:srgbClr val="00B050"/>
+          </a:solidFill>
+        </p:spPr>
+        <p:style>
+          <a:lnRef idx="2">
+            <a:schemeClr val="accent1">
+              <a:shade val="50000"/>
+            </a:schemeClr>
+          </a:lnRef>
+          <a:fillRef idx="1">
+            <a:schemeClr val="accent1"/>
+          </a:fillRef>
+          <a:effectRef idx="0">
+            <a:schemeClr val="accent1"/>
+          </a:effectRef>
+          <a:fontRef idx="minor">
+            <a:schemeClr val="lt1"/>
+          </a:fontRef>
+        </p:style>
+        <p:txBody>
+          <a:bodyPr rtlCol="0" anchor="ctr"/>
+          <a:lstStyle/>
+          <a:p>
+            <a:pPr algn="ctr"/>
+            <a:r>
+              <a:rPr lang="en-US" altLang="zh-CN" sz="1200" dirty="0"/>
+              <a:t>DSI/DII</a:t>
+            </a:r>
+            <a:endParaRPr lang="zh-CN" altLang="en-US" sz="1200" dirty="0"/>
+          </a:p>
+        </p:txBody>
+      </p:sp>
+      <p:sp>
+        <p:nvSpPr>
+          <p:cNvPr id="32" name="矩形 31">
+            <a:extLst>
+              <a:ext uri="{FF2B5EF4-FFF2-40B4-BE49-F238E27FC236}">
+                <a16:creationId xmlns:a16="http://schemas.microsoft.com/office/drawing/2014/main" id="{B21DFF99-4D33-4DF1-8572-4506AA385202}"/>
+              </a:ext>
+            </a:extLst>
+          </p:cNvPr>
+          <p:cNvSpPr/>
+          <p:nvPr/>
+        </p:nvSpPr>
+        <p:spPr>
+          <a:xfrm>
+            <a:off x="4408563" y="4386476"/>
+            <a:ext cx="1426809" cy="450572"/>
+          </a:xfrm>
+          <a:prstGeom prst="rect">
+            <a:avLst/>
+          </a:prstGeom>
+          <a:solidFill>
+            <a:srgbClr val="00B050"/>
+          </a:solidFill>
+        </p:spPr>
+        <p:style>
+          <a:lnRef idx="2">
+            <a:schemeClr val="accent1">
+              <a:shade val="50000"/>
+            </a:schemeClr>
+          </a:lnRef>
+          <a:fillRef idx="1">
+            <a:schemeClr val="accent1"/>
+          </a:fillRef>
+          <a:effectRef idx="0">
+            <a:schemeClr val="accent1"/>
+          </a:effectRef>
+          <a:fontRef idx="minor">
+            <a:schemeClr val="lt1"/>
+          </a:fontRef>
+        </p:style>
+        <p:txBody>
+          <a:bodyPr rtlCol="0" anchor="ctr"/>
+          <a:lstStyle/>
+          <a:p>
+            <a:pPr algn="ctr"/>
+            <a:r>
+              <a:rPr lang="en-US" altLang="zh-CN" sz="1200" dirty="0"/>
+              <a:t>DDM</a:t>
+            </a:r>
+            <a:endParaRPr lang="zh-CN" altLang="en-US" sz="1200" dirty="0"/>
+          </a:p>
+        </p:txBody>
+      </p:sp>
+    </p:spTree>
+    <p:extLst>
+      <p:ext uri="{BB962C8B-B14F-4D97-AF65-F5344CB8AC3E}">
+        <p14:creationId xmlns:p14="http://schemas.microsoft.com/office/powerpoint/2010/main" val="723148224"/>
       </p:ext>
     </p:extLst>
   </p:cSld>

</xml_diff>

<commit_message>
comb the DSMCC UNM DDM calling relationship
</commit_message>
<xml_diff>
--- a/doc/EverStation软件架构-2018082500.pptx
+++ b/doc/EverStation软件架构-2018082500.pptx
@@ -273,7 +273,7 @@
           <a:p>
             <a:fld id="{25500F52-4A40-4366-8FBB-3E4F48A159C8}" type="datetimeFigureOut">
               <a:rPr lang="zh-CN" altLang="en-US" smtClean="0"/>
-              <a:t>2018/10/5</a:t>
+              <a:t>2018/10/7</a:t>
             </a:fld>
             <a:endParaRPr lang="zh-CN" altLang="en-US"/>
           </a:p>
@@ -471,7 +471,7 @@
           <a:p>
             <a:fld id="{25500F52-4A40-4366-8FBB-3E4F48A159C8}" type="datetimeFigureOut">
               <a:rPr lang="zh-CN" altLang="en-US" smtClean="0"/>
-              <a:t>2018/10/5</a:t>
+              <a:t>2018/10/7</a:t>
             </a:fld>
             <a:endParaRPr lang="zh-CN" altLang="en-US"/>
           </a:p>
@@ -679,7 +679,7 @@
           <a:p>
             <a:fld id="{25500F52-4A40-4366-8FBB-3E4F48A159C8}" type="datetimeFigureOut">
               <a:rPr lang="zh-CN" altLang="en-US" smtClean="0"/>
-              <a:t>2018/10/5</a:t>
+              <a:t>2018/10/7</a:t>
             </a:fld>
             <a:endParaRPr lang="zh-CN" altLang="en-US"/>
           </a:p>
@@ -877,7 +877,7 @@
           <a:p>
             <a:fld id="{25500F52-4A40-4366-8FBB-3E4F48A159C8}" type="datetimeFigureOut">
               <a:rPr lang="zh-CN" altLang="en-US" smtClean="0"/>
-              <a:t>2018/10/5</a:t>
+              <a:t>2018/10/7</a:t>
             </a:fld>
             <a:endParaRPr lang="zh-CN" altLang="en-US"/>
           </a:p>
@@ -1152,7 +1152,7 @@
           <a:p>
             <a:fld id="{25500F52-4A40-4366-8FBB-3E4F48A159C8}" type="datetimeFigureOut">
               <a:rPr lang="zh-CN" altLang="en-US" smtClean="0"/>
-              <a:t>2018/10/5</a:t>
+              <a:t>2018/10/7</a:t>
             </a:fld>
             <a:endParaRPr lang="zh-CN" altLang="en-US"/>
           </a:p>
@@ -1417,7 +1417,7 @@
           <a:p>
             <a:fld id="{25500F52-4A40-4366-8FBB-3E4F48A159C8}" type="datetimeFigureOut">
               <a:rPr lang="zh-CN" altLang="en-US" smtClean="0"/>
-              <a:t>2018/10/5</a:t>
+              <a:t>2018/10/7</a:t>
             </a:fld>
             <a:endParaRPr lang="zh-CN" altLang="en-US"/>
           </a:p>
@@ -1829,7 +1829,7 @@
           <a:p>
             <a:fld id="{25500F52-4A40-4366-8FBB-3E4F48A159C8}" type="datetimeFigureOut">
               <a:rPr lang="zh-CN" altLang="en-US" smtClean="0"/>
-              <a:t>2018/10/5</a:t>
+              <a:t>2018/10/7</a:t>
             </a:fld>
             <a:endParaRPr lang="zh-CN" altLang="en-US"/>
           </a:p>
@@ -1970,7 +1970,7 @@
           <a:p>
             <a:fld id="{25500F52-4A40-4366-8FBB-3E4F48A159C8}" type="datetimeFigureOut">
               <a:rPr lang="zh-CN" altLang="en-US" smtClean="0"/>
-              <a:t>2018/10/5</a:t>
+              <a:t>2018/10/7</a:t>
             </a:fld>
             <a:endParaRPr lang="zh-CN" altLang="en-US"/>
           </a:p>
@@ -2083,7 +2083,7 @@
           <a:p>
             <a:fld id="{25500F52-4A40-4366-8FBB-3E4F48A159C8}" type="datetimeFigureOut">
               <a:rPr lang="zh-CN" altLang="en-US" smtClean="0"/>
-              <a:t>2018/10/5</a:t>
+              <a:t>2018/10/7</a:t>
             </a:fld>
             <a:endParaRPr lang="zh-CN" altLang="en-US"/>
           </a:p>
@@ -2394,7 +2394,7 @@
           <a:p>
             <a:fld id="{25500F52-4A40-4366-8FBB-3E4F48A159C8}" type="datetimeFigureOut">
               <a:rPr lang="zh-CN" altLang="en-US" smtClean="0"/>
-              <a:t>2018/10/5</a:t>
+              <a:t>2018/10/7</a:t>
             </a:fld>
             <a:endParaRPr lang="zh-CN" altLang="en-US"/>
           </a:p>
@@ -2682,7 +2682,7 @@
           <a:p>
             <a:fld id="{25500F52-4A40-4366-8FBB-3E4F48A159C8}" type="datetimeFigureOut">
               <a:rPr lang="zh-CN" altLang="en-US" smtClean="0"/>
-              <a:t>2018/10/5</a:t>
+              <a:t>2018/10/7</a:t>
             </a:fld>
             <a:endParaRPr lang="zh-CN" altLang="en-US"/>
           </a:p>
@@ -2923,7 +2923,7 @@
           <a:p>
             <a:fld id="{25500F52-4A40-4366-8FBB-3E4F48A159C8}" type="datetimeFigureOut">
               <a:rPr lang="zh-CN" altLang="en-US" smtClean="0"/>
-              <a:t>2018/10/5</a:t>
+              <a:t>2018/10/7</a:t>
             </a:fld>
             <a:endParaRPr lang="zh-CN" altLang="en-US"/>
           </a:p>
@@ -7153,7 +7153,7 @@
         </p:nvCxnSpPr>
         <p:spPr>
           <a:xfrm flipV="1">
-            <a:off x="3611584" y="3864481"/>
+            <a:off x="3696251" y="3864481"/>
             <a:ext cx="0" cy="494367"/>
           </a:xfrm>
           <a:prstGeom prst="line">
@@ -7288,7 +7288,7 @@
         </p:nvCxnSpPr>
         <p:spPr>
           <a:xfrm flipV="1">
-            <a:off x="3611584" y="4853982"/>
+            <a:off x="3704721" y="4853982"/>
             <a:ext cx="0" cy="494367"/>
           </a:xfrm>
           <a:prstGeom prst="line">
@@ -7423,6 +7423,247 @@
           </a:p>
         </p:txBody>
       </p:sp>
+      <p:cxnSp>
+        <p:nvCxnSpPr>
+          <p:cNvPr id="18" name="直接连接符 17">
+            <a:extLst>
+              <a:ext uri="{FF2B5EF4-FFF2-40B4-BE49-F238E27FC236}">
+                <a16:creationId xmlns:a16="http://schemas.microsoft.com/office/drawing/2014/main" id="{B6C739D9-2A99-4931-AE2E-34C75A3133FB}"/>
+              </a:ext>
+            </a:extLst>
+          </p:cNvPr>
+          <p:cNvCxnSpPr>
+            <a:cxnSpLocks/>
+          </p:cNvCxnSpPr>
+          <p:nvPr/>
+        </p:nvCxnSpPr>
+        <p:spPr>
+          <a:xfrm flipV="1">
+            <a:off x="5079818" y="4853982"/>
+            <a:ext cx="0" cy="494367"/>
+          </a:xfrm>
+          <a:prstGeom prst="line">
+            <a:avLst/>
+          </a:prstGeom>
+          <a:ln w="25400">
+            <a:solidFill>
+              <a:schemeClr val="tx1"/>
+            </a:solidFill>
+            <a:headEnd type="none"/>
+            <a:tailEnd type="stealth"/>
+          </a:ln>
+        </p:spPr>
+        <p:style>
+          <a:lnRef idx="1">
+            <a:schemeClr val="accent1"/>
+          </a:lnRef>
+          <a:fillRef idx="0">
+            <a:schemeClr val="accent1"/>
+          </a:fillRef>
+          <a:effectRef idx="0">
+            <a:schemeClr val="accent1"/>
+          </a:effectRef>
+          <a:fontRef idx="minor">
+            <a:schemeClr val="tx1"/>
+          </a:fontRef>
+        </p:style>
+      </p:cxnSp>
+      <p:sp>
+        <p:nvSpPr>
+          <p:cNvPr id="19" name="矩形 18">
+            <a:extLst>
+              <a:ext uri="{FF2B5EF4-FFF2-40B4-BE49-F238E27FC236}">
+                <a16:creationId xmlns:a16="http://schemas.microsoft.com/office/drawing/2014/main" id="{5223138B-6DC2-4C73-B7A6-1C6B5CAF5F64}"/>
+              </a:ext>
+            </a:extLst>
+          </p:cNvPr>
+          <p:cNvSpPr/>
+          <p:nvPr/>
+        </p:nvSpPr>
+        <p:spPr>
+          <a:xfrm>
+            <a:off x="4408563" y="5374134"/>
+            <a:ext cx="1426809" cy="450572"/>
+          </a:xfrm>
+          <a:prstGeom prst="rect">
+            <a:avLst/>
+          </a:prstGeom>
+          <a:solidFill>
+            <a:srgbClr val="00B050"/>
+          </a:solidFill>
+        </p:spPr>
+        <p:style>
+          <a:lnRef idx="2">
+            <a:schemeClr val="accent1">
+              <a:shade val="50000"/>
+            </a:schemeClr>
+          </a:lnRef>
+          <a:fillRef idx="1">
+            <a:schemeClr val="accent1"/>
+          </a:fillRef>
+          <a:effectRef idx="0">
+            <a:schemeClr val="accent1"/>
+          </a:effectRef>
+          <a:fontRef idx="minor">
+            <a:schemeClr val="lt1"/>
+          </a:fontRef>
+        </p:style>
+        <p:txBody>
+          <a:bodyPr rtlCol="0" anchor="ctr"/>
+          <a:lstStyle/>
+          <a:p>
+            <a:pPr algn="ctr"/>
+            <a:r>
+              <a:rPr lang="en-US" altLang="zh-CN" sz="1200" dirty="0"/>
+              <a:t>DDB</a:t>
+            </a:r>
+            <a:endParaRPr lang="zh-CN" altLang="en-US" sz="1200" dirty="0"/>
+          </a:p>
+        </p:txBody>
+      </p:sp>
+      <p:sp>
+        <p:nvSpPr>
+          <p:cNvPr id="20" name="矩形 19">
+            <a:extLst>
+              <a:ext uri="{FF2B5EF4-FFF2-40B4-BE49-F238E27FC236}">
+                <a16:creationId xmlns:a16="http://schemas.microsoft.com/office/drawing/2014/main" id="{4B5E29C3-0984-4B99-AC3A-39EAC86AF577}"/>
+              </a:ext>
+            </a:extLst>
+          </p:cNvPr>
+          <p:cNvSpPr/>
+          <p:nvPr/>
+        </p:nvSpPr>
+        <p:spPr>
+          <a:xfrm>
+            <a:off x="2916584" y="6322400"/>
+            <a:ext cx="2918788" cy="450572"/>
+          </a:xfrm>
+          <a:prstGeom prst="rect">
+            <a:avLst/>
+          </a:prstGeom>
+          <a:solidFill>
+            <a:srgbClr val="00B050"/>
+          </a:solidFill>
+        </p:spPr>
+        <p:style>
+          <a:lnRef idx="2">
+            <a:schemeClr val="accent1">
+              <a:shade val="50000"/>
+            </a:schemeClr>
+          </a:lnRef>
+          <a:fillRef idx="1">
+            <a:schemeClr val="accent1"/>
+          </a:fillRef>
+          <a:effectRef idx="0">
+            <a:schemeClr val="accent1"/>
+          </a:effectRef>
+          <a:fontRef idx="minor">
+            <a:schemeClr val="lt1"/>
+          </a:fontRef>
+        </p:style>
+        <p:txBody>
+          <a:bodyPr rtlCol="0" anchor="ctr"/>
+          <a:lstStyle/>
+          <a:p>
+            <a:pPr algn="ctr"/>
+            <a:r>
+              <a:rPr lang="en-US" altLang="zh-CN" sz="1200" dirty="0"/>
+              <a:t>BIOP</a:t>
+            </a:r>
+            <a:endParaRPr lang="zh-CN" altLang="en-US" sz="1200" dirty="0"/>
+          </a:p>
+        </p:txBody>
+      </p:sp>
+      <p:cxnSp>
+        <p:nvCxnSpPr>
+          <p:cNvPr id="21" name="直接连接符 20">
+            <a:extLst>
+              <a:ext uri="{FF2B5EF4-FFF2-40B4-BE49-F238E27FC236}">
+                <a16:creationId xmlns:a16="http://schemas.microsoft.com/office/drawing/2014/main" id="{B5491BBB-13DF-463E-B955-869FDB3C665D}"/>
+              </a:ext>
+            </a:extLst>
+          </p:cNvPr>
+          <p:cNvCxnSpPr>
+            <a:cxnSpLocks/>
+          </p:cNvCxnSpPr>
+          <p:nvPr/>
+        </p:nvCxnSpPr>
+        <p:spPr>
+          <a:xfrm flipV="1">
+            <a:off x="5079818" y="5824706"/>
+            <a:ext cx="0" cy="494367"/>
+          </a:xfrm>
+          <a:prstGeom prst="line">
+            <a:avLst/>
+          </a:prstGeom>
+          <a:ln w="25400">
+            <a:solidFill>
+              <a:schemeClr val="tx1"/>
+            </a:solidFill>
+            <a:headEnd type="none"/>
+            <a:tailEnd type="stealth"/>
+          </a:ln>
+        </p:spPr>
+        <p:style>
+          <a:lnRef idx="1">
+            <a:schemeClr val="accent1"/>
+          </a:lnRef>
+          <a:fillRef idx="0">
+            <a:schemeClr val="accent1"/>
+          </a:fillRef>
+          <a:effectRef idx="0">
+            <a:schemeClr val="accent1"/>
+          </a:effectRef>
+          <a:fontRef idx="minor">
+            <a:schemeClr val="tx1"/>
+          </a:fontRef>
+        </p:style>
+      </p:cxnSp>
+      <p:cxnSp>
+        <p:nvCxnSpPr>
+          <p:cNvPr id="22" name="直接连接符 21">
+            <a:extLst>
+              <a:ext uri="{FF2B5EF4-FFF2-40B4-BE49-F238E27FC236}">
+                <a16:creationId xmlns:a16="http://schemas.microsoft.com/office/drawing/2014/main" id="{061E30CF-99A2-4077-9C11-342F9769DF3C}"/>
+              </a:ext>
+            </a:extLst>
+          </p:cNvPr>
+          <p:cNvCxnSpPr>
+            <a:cxnSpLocks/>
+          </p:cNvCxnSpPr>
+          <p:nvPr/>
+        </p:nvCxnSpPr>
+        <p:spPr>
+          <a:xfrm flipV="1">
+            <a:off x="3708218" y="5824706"/>
+            <a:ext cx="0" cy="494367"/>
+          </a:xfrm>
+          <a:prstGeom prst="line">
+            <a:avLst/>
+          </a:prstGeom>
+          <a:ln w="25400">
+            <a:solidFill>
+              <a:schemeClr val="tx1"/>
+            </a:solidFill>
+            <a:headEnd type="none"/>
+            <a:tailEnd type="stealth"/>
+          </a:ln>
+        </p:spPr>
+        <p:style>
+          <a:lnRef idx="1">
+            <a:schemeClr val="accent1"/>
+          </a:lnRef>
+          <a:fillRef idx="0">
+            <a:schemeClr val="accent1"/>
+          </a:fillRef>
+          <a:effectRef idx="0">
+            <a:schemeClr val="accent1"/>
+          </a:effectRef>
+          <a:fontRef idx="minor">
+            <a:schemeClr val="tx1"/>
+          </a:fontRef>
+        </p:style>
+      </p:cxnSp>
     </p:spTree>
     <p:extLst>
       <p:ext uri="{BB962C8B-B14F-4D97-AF65-F5344CB8AC3E}">

</xml_diff>